<commit_message>
update compiler and frontend and inference md.
</commit_message>
<xml_diff>
--- a/Inference/Kernel/07.nc4hw4.pptx
+++ b/Inference/Kernel/07.nc4hw4.pptx
@@ -567,7 +567,7 @@
             <a:fld id="{C45443A1-D8F2-48CD-A659-3CEDBA8DF541}" type="datetimeFigureOut">
               <a:rPr lang="zh-CN" altLang="en-US" smtClean="0"/>
               <a:pPr/>
-              <a:t>2023/3/2</a:t>
+              <a:t>2023/3/7</a:t>
             </a:fld>
             <a:endParaRPr lang="zh-CN" altLang="en-US"/>
           </a:p>
@@ -38913,7 +38913,7 @@
           <a:blip r:embed="rId2">
             <a:extLst>
               <a:ext uri="{28A0092B-C50C-407E-A947-70E740481C1C}">
-                <a14:useLocalDpi xmlns:a14="http://schemas.microsoft.com/office/drawing/2010/main" val="0"/>
+                <a14:useLocalDpi xmlns:a14="http://schemas.microsoft.com/office/drawing/2010/main"/>
               </a:ext>
             </a:extLst>
           </a:blip>
@@ -40926,10 +40926,10 @@
           <p:nvPr/>
         </p:nvPicPr>
         <p:blipFill>
-          <a:blip r:embed="rId2">
+          <a:blip r:embed="rId2" cstate="screen">
             <a:extLst>
               <a:ext uri="{28A0092B-C50C-407E-A947-70E740481C1C}">
-                <a14:useLocalDpi xmlns:a14="http://schemas.microsoft.com/office/drawing/2010/main" val="0"/>
+                <a14:useLocalDpi xmlns:a14="http://schemas.microsoft.com/office/drawing/2010/main"/>
               </a:ext>
             </a:extLst>
           </a:blip>
@@ -40962,10 +40962,10 @@
           <p:nvPr/>
         </p:nvPicPr>
         <p:blipFill>
-          <a:blip r:embed="rId3">
+          <a:blip r:embed="rId3" cstate="screen">
             <a:extLst>
               <a:ext uri="{28A0092B-C50C-407E-A947-70E740481C1C}">
-                <a14:useLocalDpi xmlns:a14="http://schemas.microsoft.com/office/drawing/2010/main" val="0"/>
+                <a14:useLocalDpi xmlns:a14="http://schemas.microsoft.com/office/drawing/2010/main"/>
               </a:ext>
             </a:extLst>
           </a:blip>
@@ -44024,7 +44024,7 @@
           <a:blip r:embed="rId2">
             <a:extLst>
               <a:ext uri="{28A0092B-C50C-407E-A947-70E740481C1C}">
-                <a14:useLocalDpi xmlns:a14="http://schemas.microsoft.com/office/drawing/2010/main" val="0"/>
+                <a14:useLocalDpi xmlns:a14="http://schemas.microsoft.com/office/drawing/2010/main"/>
               </a:ext>
             </a:extLst>
           </a:blip>
@@ -44139,7 +44139,7 @@
           <a:blip r:embed="rId2">
             <a:extLst>
               <a:ext uri="{28A0092B-C50C-407E-A947-70E740481C1C}">
-                <a14:useLocalDpi xmlns:a14="http://schemas.microsoft.com/office/drawing/2010/main" val="0"/>
+                <a14:useLocalDpi xmlns:a14="http://schemas.microsoft.com/office/drawing/2010/main"/>
               </a:ext>
             </a:extLst>
           </a:blip>
@@ -44266,7 +44266,7 @@
           <a:blip r:embed="rId2">
             <a:extLst>
               <a:ext uri="{28A0092B-C50C-407E-A947-70E740481C1C}">
-                <a14:useLocalDpi xmlns:a14="http://schemas.microsoft.com/office/drawing/2010/main" val="0"/>
+                <a14:useLocalDpi xmlns:a14="http://schemas.microsoft.com/office/drawing/2010/main"/>
               </a:ext>
             </a:extLst>
           </a:blip>
@@ -44572,10 +44572,10 @@
           <p:nvPr/>
         </p:nvPicPr>
         <p:blipFill>
-          <a:blip r:embed="rId2">
+          <a:blip r:embed="rId2" cstate="screen">
             <a:extLst>
               <a:ext uri="{28A0092B-C50C-407E-A947-70E740481C1C}">
-                <a14:useLocalDpi xmlns:a14="http://schemas.microsoft.com/office/drawing/2010/main" val="0"/>
+                <a14:useLocalDpi xmlns:a14="http://schemas.microsoft.com/office/drawing/2010/main"/>
               </a:ext>
             </a:extLst>
           </a:blip>
@@ -44840,7 +44840,7 @@
           <a:blip r:embed="rId2">
             <a:extLst>
               <a:ext uri="{28A0092B-C50C-407E-A947-70E740481C1C}">
-                <a14:useLocalDpi xmlns:a14="http://schemas.microsoft.com/office/drawing/2010/main" val="0"/>
+                <a14:useLocalDpi xmlns:a14="http://schemas.microsoft.com/office/drawing/2010/main"/>
               </a:ext>
             </a:extLst>
           </a:blip>

</xml_diff>